<commit_message>
Updated Profiles and Projects
</commit_message>
<xml_diff>
--- a/static/img/header.pptx
+++ b/static/img/header.pptx
@@ -6,6 +6,7 @@
   </p:sldMasterIdLst>
   <p:sldIdLst>
     <p:sldId id="256" r:id="rId2"/>
+    <p:sldId id="257" r:id="rId3"/>
   </p:sldIdLst>
   <p:sldSz cx="12192000" cy="6858000"/>
   <p:notesSz cx="6858000" cy="9144000"/>
@@ -2728,7 +2729,7 @@
           <a:p>
             <a:fld id="{FADD4C53-05BA-BC46-8367-0538CD8060A9}" type="datetimeFigureOut">
               <a:rPr lang="en-GB" smtClean="0"/>
-              <a:t>21/10/2019</a:t>
+              <a:t>16/12/2019</a:t>
             </a:fld>
             <a:endParaRPr lang="en-GB"/>
           </a:p>
@@ -2926,7 +2927,7 @@
           <a:p>
             <a:fld id="{FADD4C53-05BA-BC46-8367-0538CD8060A9}" type="datetimeFigureOut">
               <a:rPr lang="en-GB" smtClean="0"/>
-              <a:t>21/10/2019</a:t>
+              <a:t>16/12/2019</a:t>
             </a:fld>
             <a:endParaRPr lang="en-GB"/>
           </a:p>
@@ -3134,7 +3135,7 @@
           <a:p>
             <a:fld id="{FADD4C53-05BA-BC46-8367-0538CD8060A9}" type="datetimeFigureOut">
               <a:rPr lang="en-GB" smtClean="0"/>
-              <a:t>21/10/2019</a:t>
+              <a:t>16/12/2019</a:t>
             </a:fld>
             <a:endParaRPr lang="en-GB"/>
           </a:p>
@@ -3332,7 +3333,7 @@
           <a:p>
             <a:fld id="{FADD4C53-05BA-BC46-8367-0538CD8060A9}" type="datetimeFigureOut">
               <a:rPr lang="en-GB" smtClean="0"/>
-              <a:t>21/10/2019</a:t>
+              <a:t>16/12/2019</a:t>
             </a:fld>
             <a:endParaRPr lang="en-GB"/>
           </a:p>
@@ -3607,7 +3608,7 @@
           <a:p>
             <a:fld id="{FADD4C53-05BA-BC46-8367-0538CD8060A9}" type="datetimeFigureOut">
               <a:rPr lang="en-GB" smtClean="0"/>
-              <a:t>21/10/2019</a:t>
+              <a:t>16/12/2019</a:t>
             </a:fld>
             <a:endParaRPr lang="en-GB"/>
           </a:p>
@@ -3872,7 +3873,7 @@
           <a:p>
             <a:fld id="{FADD4C53-05BA-BC46-8367-0538CD8060A9}" type="datetimeFigureOut">
               <a:rPr lang="en-GB" smtClean="0"/>
-              <a:t>21/10/2019</a:t>
+              <a:t>16/12/2019</a:t>
             </a:fld>
             <a:endParaRPr lang="en-GB"/>
           </a:p>
@@ -4284,7 +4285,7 @@
           <a:p>
             <a:fld id="{FADD4C53-05BA-BC46-8367-0538CD8060A9}" type="datetimeFigureOut">
               <a:rPr lang="en-GB" smtClean="0"/>
-              <a:t>21/10/2019</a:t>
+              <a:t>16/12/2019</a:t>
             </a:fld>
             <a:endParaRPr lang="en-GB"/>
           </a:p>
@@ -4425,7 +4426,7 @@
           <a:p>
             <a:fld id="{FADD4C53-05BA-BC46-8367-0538CD8060A9}" type="datetimeFigureOut">
               <a:rPr lang="en-GB" smtClean="0"/>
-              <a:t>21/10/2019</a:t>
+              <a:t>16/12/2019</a:t>
             </a:fld>
             <a:endParaRPr lang="en-GB"/>
           </a:p>
@@ -4538,7 +4539,7 @@
           <a:p>
             <a:fld id="{FADD4C53-05BA-BC46-8367-0538CD8060A9}" type="datetimeFigureOut">
               <a:rPr lang="en-GB" smtClean="0"/>
-              <a:t>21/10/2019</a:t>
+              <a:t>16/12/2019</a:t>
             </a:fld>
             <a:endParaRPr lang="en-GB"/>
           </a:p>
@@ -4849,7 +4850,7 @@
           <a:p>
             <a:fld id="{FADD4C53-05BA-BC46-8367-0538CD8060A9}" type="datetimeFigureOut">
               <a:rPr lang="en-GB" smtClean="0"/>
-              <a:t>21/10/2019</a:t>
+              <a:t>16/12/2019</a:t>
             </a:fld>
             <a:endParaRPr lang="en-GB"/>
           </a:p>
@@ -5137,7 +5138,7 @@
           <a:p>
             <a:fld id="{FADD4C53-05BA-BC46-8367-0538CD8060A9}" type="datetimeFigureOut">
               <a:rPr lang="en-GB" smtClean="0"/>
-              <a:t>21/10/2019</a:t>
+              <a:t>16/12/2019</a:t>
             </a:fld>
             <a:endParaRPr lang="en-GB"/>
           </a:p>
@@ -5378,7 +5379,7 @@
           <a:p>
             <a:fld id="{FADD4C53-05BA-BC46-8367-0538CD8060A9}" type="datetimeFigureOut">
               <a:rPr lang="en-GB" smtClean="0"/>
-              <a:t>21/10/2019</a:t>
+              <a:t>16/12/2019</a:t>
             </a:fld>
             <a:endParaRPr lang="en-GB"/>
           </a:p>
@@ -6488,6 +6489,117 @@
 </p:sld>
 </file>
 
+<file path=ppt/slides/slide2.xml><?xml version="1.0" encoding="utf-8"?>
+<p:sld xmlns:a="http://schemas.openxmlformats.org/drawingml/2006/main" xmlns:r="http://schemas.openxmlformats.org/officeDocument/2006/relationships" xmlns:p="http://schemas.openxmlformats.org/presentationml/2006/main">
+  <p:cSld>
+    <p:spTree>
+      <p:nvGrpSpPr>
+        <p:cNvPr id="1" name=""/>
+        <p:cNvGrpSpPr/>
+        <p:nvPr/>
+      </p:nvGrpSpPr>
+      <p:grpSpPr>
+        <a:xfrm>
+          <a:off x="0" y="0"/>
+          <a:ext cx="0" cy="0"/>
+          <a:chOff x="0" y="0"/>
+          <a:chExt cx="0" cy="0"/>
+        </a:xfrm>
+      </p:grpSpPr>
+      <p:pic>
+        <p:nvPicPr>
+          <p:cNvPr id="7" name="Picture 6">
+            <a:extLst>
+              <a:ext uri="{FF2B5EF4-FFF2-40B4-BE49-F238E27FC236}">
+                <a16:creationId xmlns:a16="http://schemas.microsoft.com/office/drawing/2014/main" id="{BD891154-1CD8-6F46-A642-19768B87CE25}"/>
+              </a:ext>
+            </a:extLst>
+          </p:cNvPr>
+          <p:cNvPicPr>
+            <a:picLocks noChangeAspect="1"/>
+          </p:cNvPicPr>
+          <p:nvPr/>
+        </p:nvPicPr>
+        <p:blipFill rotWithShape="1">
+          <a:blip r:embed="rId2"/>
+          <a:srcRect l="19643" t="9870" r="22500" b="12381"/>
+          <a:stretch/>
+        </p:blipFill>
+        <p:spPr>
+          <a:xfrm>
+            <a:off x="2999500" y="769340"/>
+            <a:ext cx="6471674" cy="5978982"/>
+          </a:xfrm>
+          <a:prstGeom prst="rect">
+            <a:avLst/>
+          </a:prstGeom>
+        </p:spPr>
+      </p:pic>
+      <p:pic>
+        <p:nvPicPr>
+          <p:cNvPr id="12" name="Picture 11">
+            <a:extLst>
+              <a:ext uri="{FF2B5EF4-FFF2-40B4-BE49-F238E27FC236}">
+                <a16:creationId xmlns:a16="http://schemas.microsoft.com/office/drawing/2014/main" id="{E1840647-98A6-D84B-A90C-2D8D74121A67}"/>
+              </a:ext>
+            </a:extLst>
+          </p:cNvPr>
+          <p:cNvPicPr>
+            <a:picLocks noChangeAspect="1"/>
+          </p:cNvPicPr>
+          <p:nvPr/>
+        </p:nvPicPr>
+        <p:blipFill rotWithShape="1">
+          <a:blip r:embed="rId3">
+            <a:clrChange>
+              <a:clrFrom>
+                <a:srgbClr val="FFFFFF"/>
+              </a:clrFrom>
+              <a:clrTo>
+                <a:srgbClr val="FFFFFF">
+                  <a:alpha val="0"/>
+                </a:srgbClr>
+              </a:clrTo>
+            </a:clrChange>
+            <a:alphaModFix amt="50000"/>
+            <a:extLst>
+              <a:ext uri="{BEBA8EAE-BF5A-486C-A8C5-ECC9F3942E4B}">
+                <a14:imgProps xmlns:a14="http://schemas.microsoft.com/office/drawing/2010/main">
+                  <a14:imgLayer r:embed="rId4">
+                    <a14:imgEffect>
+                      <a14:artisticPaintBrush/>
+                    </a14:imgEffect>
+                  </a14:imgLayer>
+                </a14:imgProps>
+              </a:ext>
+            </a:extLst>
+          </a:blip>
+          <a:srcRect t="21432" b="19180"/>
+          <a:stretch/>
+        </p:blipFill>
+        <p:spPr>
+          <a:xfrm rot="3223522">
+            <a:off x="3425463" y="955573"/>
+            <a:ext cx="4845772" cy="4072874"/>
+          </a:xfrm>
+          <a:prstGeom prst="rect">
+            <a:avLst/>
+          </a:prstGeom>
+        </p:spPr>
+      </p:pic>
+    </p:spTree>
+    <p:extLst>
+      <p:ext uri="{BB962C8B-B14F-4D97-AF65-F5344CB8AC3E}">
+        <p14:creationId xmlns:p14="http://schemas.microsoft.com/office/powerpoint/2010/main" val="1351875672"/>
+      </p:ext>
+    </p:extLst>
+  </p:cSld>
+  <p:clrMapOvr>
+    <a:masterClrMapping/>
+  </p:clrMapOvr>
+</p:sld>
+</file>
+
 <file path=ppt/theme/theme1.xml><?xml version="1.0" encoding="utf-8"?>
 <a:theme xmlns:a="http://schemas.openxmlformats.org/drawingml/2006/main" name="Office Theme">
   <a:themeElements>

</xml_diff>

<commit_message>
Updated MSc Thesis for Oana and Abel
</commit_message>
<xml_diff>
--- a/static/img/header.pptx
+++ b/static/img/header.pptx
@@ -2729,7 +2729,7 @@
           <a:p>
             <a:fld id="{FADD4C53-05BA-BC46-8367-0538CD8060A9}" type="datetimeFigureOut">
               <a:rPr lang="en-GB" smtClean="0"/>
-              <a:t>16/12/2019</a:t>
+              <a:t>04/03/2020</a:t>
             </a:fld>
             <a:endParaRPr lang="en-GB"/>
           </a:p>
@@ -2927,7 +2927,7 @@
           <a:p>
             <a:fld id="{FADD4C53-05BA-BC46-8367-0538CD8060A9}" type="datetimeFigureOut">
               <a:rPr lang="en-GB" smtClean="0"/>
-              <a:t>16/12/2019</a:t>
+              <a:t>04/03/2020</a:t>
             </a:fld>
             <a:endParaRPr lang="en-GB"/>
           </a:p>
@@ -3135,7 +3135,7 @@
           <a:p>
             <a:fld id="{FADD4C53-05BA-BC46-8367-0538CD8060A9}" type="datetimeFigureOut">
               <a:rPr lang="en-GB" smtClean="0"/>
-              <a:t>16/12/2019</a:t>
+              <a:t>04/03/2020</a:t>
             </a:fld>
             <a:endParaRPr lang="en-GB"/>
           </a:p>
@@ -3333,7 +3333,7 @@
           <a:p>
             <a:fld id="{FADD4C53-05BA-BC46-8367-0538CD8060A9}" type="datetimeFigureOut">
               <a:rPr lang="en-GB" smtClean="0"/>
-              <a:t>16/12/2019</a:t>
+              <a:t>04/03/2020</a:t>
             </a:fld>
             <a:endParaRPr lang="en-GB"/>
           </a:p>
@@ -3608,7 +3608,7 @@
           <a:p>
             <a:fld id="{FADD4C53-05BA-BC46-8367-0538CD8060A9}" type="datetimeFigureOut">
               <a:rPr lang="en-GB" smtClean="0"/>
-              <a:t>16/12/2019</a:t>
+              <a:t>04/03/2020</a:t>
             </a:fld>
             <a:endParaRPr lang="en-GB"/>
           </a:p>
@@ -3873,7 +3873,7 @@
           <a:p>
             <a:fld id="{FADD4C53-05BA-BC46-8367-0538CD8060A9}" type="datetimeFigureOut">
               <a:rPr lang="en-GB" smtClean="0"/>
-              <a:t>16/12/2019</a:t>
+              <a:t>04/03/2020</a:t>
             </a:fld>
             <a:endParaRPr lang="en-GB"/>
           </a:p>
@@ -4285,7 +4285,7 @@
           <a:p>
             <a:fld id="{FADD4C53-05BA-BC46-8367-0538CD8060A9}" type="datetimeFigureOut">
               <a:rPr lang="en-GB" smtClean="0"/>
-              <a:t>16/12/2019</a:t>
+              <a:t>04/03/2020</a:t>
             </a:fld>
             <a:endParaRPr lang="en-GB"/>
           </a:p>
@@ -4426,7 +4426,7 @@
           <a:p>
             <a:fld id="{FADD4C53-05BA-BC46-8367-0538CD8060A9}" type="datetimeFigureOut">
               <a:rPr lang="en-GB" smtClean="0"/>
-              <a:t>16/12/2019</a:t>
+              <a:t>04/03/2020</a:t>
             </a:fld>
             <a:endParaRPr lang="en-GB"/>
           </a:p>
@@ -4539,7 +4539,7 @@
           <a:p>
             <a:fld id="{FADD4C53-05BA-BC46-8367-0538CD8060A9}" type="datetimeFigureOut">
               <a:rPr lang="en-GB" smtClean="0"/>
-              <a:t>16/12/2019</a:t>
+              <a:t>04/03/2020</a:t>
             </a:fld>
             <a:endParaRPr lang="en-GB"/>
           </a:p>
@@ -4850,7 +4850,7 @@
           <a:p>
             <a:fld id="{FADD4C53-05BA-BC46-8367-0538CD8060A9}" type="datetimeFigureOut">
               <a:rPr lang="en-GB" smtClean="0"/>
-              <a:t>16/12/2019</a:t>
+              <a:t>04/03/2020</a:t>
             </a:fld>
             <a:endParaRPr lang="en-GB"/>
           </a:p>
@@ -5138,7 +5138,7 @@
           <a:p>
             <a:fld id="{FADD4C53-05BA-BC46-8367-0538CD8060A9}" type="datetimeFigureOut">
               <a:rPr lang="en-GB" smtClean="0"/>
-              <a:t>16/12/2019</a:t>
+              <a:t>04/03/2020</a:t>
             </a:fld>
             <a:endParaRPr lang="en-GB"/>
           </a:p>
@@ -5379,7 +5379,7 @@
           <a:p>
             <a:fld id="{FADD4C53-05BA-BC46-8367-0538CD8060A9}" type="datetimeFigureOut">
               <a:rPr lang="en-GB" smtClean="0"/>
-              <a:t>16/12/2019</a:t>
+              <a:t>04/03/2020</a:t>
             </a:fld>
             <a:endParaRPr lang="en-GB"/>
           </a:p>
@@ -5982,8 +5982,8 @@
         </p:nvSpPr>
         <p:spPr>
           <a:xfrm>
-            <a:off x="2853924" y="2542669"/>
-            <a:ext cx="1237839" cy="1148648"/>
+            <a:off x="3427584" y="1175605"/>
+            <a:ext cx="1051891" cy="1148648"/>
           </a:xfrm>
           <a:prstGeom prst="rect">
             <a:avLst/>
@@ -6011,7 +6011,7 @@
                 </a:solidFill>
                 <a:latin typeface="+mj-lt"/>
               </a:rPr>
-              <a:t>Data</a:t>
+              <a:t>Data-Driven</a:t>
             </a:r>
           </a:p>
           <a:p>
@@ -6042,7 +6042,7 @@
                 </a:solidFill>
                 <a:latin typeface="+mj-lt"/>
               </a:rPr>
-              <a:t>Open Source GIS</a:t>
+              <a:t>Open Source</a:t>
             </a:r>
           </a:p>
           <a:p>
@@ -6061,7 +6061,7 @@
                 </a:solidFill>
                 <a:latin typeface="+mj-lt"/>
               </a:rPr>
-              <a:t>    Engineering</a:t>
+              <a:t>    GIS</a:t>
             </a:r>
           </a:p>
           <a:p>
@@ -6080,7 +6080,7 @@
                 </a:solidFill>
                 <a:latin typeface="+mj-lt"/>
               </a:rPr>
-              <a:t>    Visualisation</a:t>
+              <a:t>    Sensors</a:t>
             </a:r>
           </a:p>
           <a:p>
@@ -6118,8 +6118,8 @@
         </p:nvSpPr>
         <p:spPr>
           <a:xfrm>
-            <a:off x="8454712" y="1858584"/>
-            <a:ext cx="1346844" cy="909801"/>
+            <a:off x="7411022" y="1348989"/>
+            <a:ext cx="1253869" cy="706668"/>
           </a:xfrm>
           <a:prstGeom prst="rect">
             <a:avLst/>
@@ -6147,7 +6147,7 @@
                 </a:solidFill>
                 <a:latin typeface="+mj-lt"/>
               </a:rPr>
-              <a:t>Discovery</a:t>
+              <a:t>Decision-Making</a:t>
             </a:r>
           </a:p>
           <a:p>
@@ -6166,7 +6166,7 @@
                 </a:solidFill>
                 <a:latin typeface="+mj-lt"/>
               </a:rPr>
-              <a:t>   Bayesian Inference</a:t>
+              <a:t>   Facts and Figures</a:t>
             </a:r>
           </a:p>
           <a:p>
@@ -6185,26 +6185,7 @@
                 </a:solidFill>
                 <a:latin typeface="+mj-lt"/>
               </a:rPr>
-              <a:t>   Machine Learning</a:t>
-            </a:r>
-          </a:p>
-          <a:p>
-            <a:pPr>
-              <a:lnSpc>
-                <a:spcPct val="120000"/>
-              </a:lnSpc>
-            </a:pPr>
-            <a:r>
-              <a:rPr lang="en-GB" sz="1100" dirty="0">
-                <a:solidFill>
-                  <a:schemeClr val="tx1">
-                    <a:lumMod val="65000"/>
-                    <a:lumOff val="35000"/>
-                  </a:schemeClr>
-                </a:solidFill>
-                <a:latin typeface="+mj-lt"/>
-              </a:rPr>
-              <a:t>   Human Behaviour</a:t>
+              <a:t>  </a:t>
             </a:r>
           </a:p>
         </p:txBody>
@@ -6224,7 +6205,7 @@
         <p:spPr>
           <a:xfrm>
             <a:off x="7329735" y="4856944"/>
-            <a:ext cx="2044149" cy="928267"/>
+            <a:ext cx="2201244" cy="1131400"/>
           </a:xfrm>
           <a:prstGeom prst="rect">
             <a:avLst/>
@@ -6252,7 +6233,7 @@
                 </a:solidFill>
                 <a:latin typeface="+mj-lt"/>
               </a:rPr>
-              <a:t>Dynamics</a:t>
+              <a:t>Development</a:t>
             </a:r>
           </a:p>
           <a:p>
@@ -6283,7 +6264,7 @@
                 </a:solidFill>
                 <a:latin typeface="+mj-lt"/>
               </a:rPr>
-              <a:t>Computational Modelling</a:t>
+              <a:t>Urban Planning</a:t>
             </a:r>
           </a:p>
           <a:p>
@@ -6302,16 +6283,9 @@
                 </a:solidFill>
                 <a:latin typeface="+mj-lt"/>
               </a:rPr>
-              <a:t>   Spatiotemporal Dynamics</a:t>
-            </a:r>
-          </a:p>
-          <a:p>
-            <a:pPr>
-              <a:lnSpc>
-                <a:spcPct val="120000"/>
-              </a:lnSpc>
-            </a:pPr>
-            <a:r>
+              <a:t>   Governance of Market Economies</a:t>
+            </a:r>
+            <a:br>
               <a:rPr lang="en-GB" sz="1100" dirty="0">
                 <a:solidFill>
                   <a:schemeClr val="tx1">
@@ -6321,7 +6295,37 @@
                 </a:solidFill>
                 <a:latin typeface="+mj-lt"/>
               </a:rPr>
-              <a:t>   Dependencies &amp; Vulnerabilities</a:t>
+            </a:br>
+            <a:r>
+              <a:rPr lang="en-GB" sz="1100" dirty="0">
+                <a:solidFill>
+                  <a:schemeClr val="tx1">
+                    <a:lumMod val="65000"/>
+                    <a:lumOff val="35000"/>
+                  </a:schemeClr>
+                </a:solidFill>
+                <a:latin typeface="+mj-lt"/>
+              </a:rPr>
+              <a:t>   Equitable Access for all Peoples</a:t>
+            </a:r>
+          </a:p>
+          <a:p>
+            <a:pPr>
+              <a:lnSpc>
+                <a:spcPct val="120000"/>
+              </a:lnSpc>
+            </a:pPr>
+            <a:r>
+              <a:rPr lang="en-GB" sz="1100" dirty="0">
+                <a:solidFill>
+                  <a:schemeClr val="tx1">
+                    <a:lumMod val="65000"/>
+                    <a:lumOff val="35000"/>
+                  </a:schemeClr>
+                </a:solidFill>
+                <a:latin typeface="+mj-lt"/>
+              </a:rPr>
+              <a:t>   </a:t>
             </a:r>
           </a:p>
         </p:txBody>
@@ -6340,8 +6344,8 @@
         </p:nvSpPr>
         <p:spPr>
           <a:xfrm>
-            <a:off x="3420698" y="4909335"/>
-            <a:ext cx="1233030" cy="725135"/>
+            <a:off x="3475359" y="4833328"/>
+            <a:ext cx="1042273" cy="725135"/>
           </a:xfrm>
           <a:prstGeom prst="rect">
             <a:avLst/>
@@ -6369,7 +6373,7 @@
                 </a:solidFill>
                 <a:latin typeface="+mj-lt"/>
               </a:rPr>
-              <a:t>Development</a:t>
+              <a:t>Cities</a:t>
             </a:r>
           </a:p>
           <a:p>
@@ -6400,7 +6404,7 @@
                 </a:solidFill>
                 <a:latin typeface="+mj-lt"/>
               </a:rPr>
-              <a:t>Initiatives</a:t>
+              <a:t>Support</a:t>
             </a:r>
           </a:p>
           <a:p>
@@ -6419,7 +6423,7 @@
                 </a:solidFill>
                 <a:latin typeface="+mj-lt"/>
               </a:rPr>
-              <a:t>   Policy Evaluation</a:t>
+              <a:t>   Collaboration</a:t>
             </a:r>
           </a:p>
         </p:txBody>

</xml_diff>